<commit_message>
User Manual update (unfinished)
</commit_message>
<xml_diff>
--- a/User Manual Source/Release Notes V2.2.pptx
+++ b/User Manual Source/Release Notes V2.2.pptx
@@ -5,10 +5,10 @@
     <p:sldMasterId id="2147483648" r:id="rId1"/>
   </p:sldMasterIdLst>
   <p:notesMasterIdLst>
-    <p:notesMasterId r:id="rId17"/>
+    <p:notesMasterId r:id="rId18"/>
   </p:notesMasterIdLst>
   <p:handoutMasterIdLst>
-    <p:handoutMasterId r:id="rId18"/>
+    <p:handoutMasterId r:id="rId19"/>
   </p:handoutMasterIdLst>
   <p:sldIdLst>
     <p:sldId id="575" r:id="rId2"/>
@@ -18,14 +18,15 @@
     <p:sldId id="643" r:id="rId6"/>
     <p:sldId id="644" r:id="rId7"/>
     <p:sldId id="639" r:id="rId8"/>
-    <p:sldId id="638" r:id="rId9"/>
-    <p:sldId id="600" r:id="rId10"/>
-    <p:sldId id="633" r:id="rId11"/>
-    <p:sldId id="635" r:id="rId12"/>
-    <p:sldId id="636" r:id="rId13"/>
-    <p:sldId id="629" r:id="rId14"/>
-    <p:sldId id="637" r:id="rId15"/>
-    <p:sldId id="634" r:id="rId16"/>
+    <p:sldId id="645" r:id="rId9"/>
+    <p:sldId id="638" r:id="rId10"/>
+    <p:sldId id="600" r:id="rId11"/>
+    <p:sldId id="633" r:id="rId12"/>
+    <p:sldId id="635" r:id="rId13"/>
+    <p:sldId id="636" r:id="rId14"/>
+    <p:sldId id="629" r:id="rId15"/>
+    <p:sldId id="637" r:id="rId16"/>
+    <p:sldId id="634" r:id="rId17"/>
   </p:sldIdLst>
   <p:sldSz cx="9144000" cy="6858000" type="screen4x3"/>
   <p:notesSz cx="6805613" cy="9944100"/>
@@ -1537,7 +1538,7 @@
               <a:pPr>
                 <a:defRPr/>
               </a:pPr>
-              <a:t>10</a:t>
+              <a:t>11</a:t>
             </a:fld>
             <a:endParaRPr lang="de-AT"/>
           </a:p>
@@ -1632,7 +1633,7 @@
               <a:pPr>
                 <a:defRPr/>
               </a:pPr>
-              <a:t>11</a:t>
+              <a:t>12</a:t>
             </a:fld>
             <a:endParaRPr lang="de-AT"/>
           </a:p>
@@ -1727,7 +1728,7 @@
               <a:pPr>
                 <a:defRPr/>
               </a:pPr>
-              <a:t>12</a:t>
+              <a:t>13</a:t>
             </a:fld>
             <a:endParaRPr lang="de-AT"/>
           </a:p>
@@ -1822,7 +1823,7 @@
               <a:pPr>
                 <a:defRPr/>
               </a:pPr>
-              <a:t>13</a:t>
+              <a:t>14</a:t>
             </a:fld>
             <a:endParaRPr lang="de-AT"/>
           </a:p>
@@ -1917,7 +1918,7 @@
               <a:pPr>
                 <a:defRPr/>
               </a:pPr>
-              <a:t>14</a:t>
+              <a:t>15</a:t>
             </a:fld>
             <a:endParaRPr lang="de-AT"/>
           </a:p>
@@ -5314,23 +5315,7 @@
                   <a:srgbClr val="990000"/>
                 </a:solidFill>
               </a:rPr>
-              <a:t>VECTO </a:t>
-            </a:r>
-            <a:r>
-              <a:rPr lang="en-US" sz="3200" dirty="0" smtClean="0">
-                <a:solidFill>
-                  <a:srgbClr val="990000"/>
-                </a:solidFill>
-              </a:rPr>
-              <a:t>2.2</a:t>
-            </a:r>
-            <a:r>
-              <a:rPr lang="en-US" sz="3200" dirty="0" smtClean="0">
-                <a:solidFill>
-                  <a:srgbClr val="990000"/>
-                </a:solidFill>
-              </a:rPr>
-              <a:t/>
+              <a:t>VECTO 2.2</a:t>
             </a:r>
             <a:br>
               <a:rPr lang="en-US" sz="3200" dirty="0" smtClean="0">
@@ -5347,11 +5332,6 @@
               </a:rPr>
               <a:t>22.07.2015</a:t>
             </a:r>
-            <a:endParaRPr lang="en-US" sz="2000" dirty="0" smtClean="0">
-              <a:solidFill>
-                <a:srgbClr val="990000"/>
-              </a:solidFill>
-            </a:endParaRPr>
           </a:p>
           <a:p>
             <a:pPr eaLnBrk="1" hangingPunct="1"/>
@@ -5512,6 +5492,479 @@
           <a:chExt cx="0" cy="0"/>
         </a:xfrm>
       </p:grpSpPr>
+      <p:sp>
+        <p:nvSpPr>
+          <p:cNvPr id="5" name="Rectangle 3"/>
+          <p:cNvSpPr txBox="1">
+            <a:spLocks noChangeArrowheads="1"/>
+          </p:cNvSpPr>
+          <p:nvPr/>
+        </p:nvSpPr>
+        <p:spPr bwMode="auto">
+          <a:xfrm>
+            <a:off x="0" y="778669"/>
+            <a:ext cx="9144000" cy="346075"/>
+          </a:xfrm>
+          <a:prstGeom prst="rect">
+            <a:avLst/>
+          </a:prstGeom>
+          <a:noFill/>
+          <a:ln>
+            <a:noFill/>
+          </a:ln>
+          <a:effectLst/>
+          <a:extLst>
+            <a:ext uri="{909E8E84-426E-40DD-AFC4-6F175D3DCCD1}">
+              <a14:hiddenFill xmlns:a14="http://schemas.microsoft.com/office/drawing/2010/main">
+                <a:solidFill>
+                  <a:srgbClr val="DDDDDD"/>
+                </a:solidFill>
+              </a14:hiddenFill>
+            </a:ext>
+            <a:ext uri="{91240B29-F687-4F45-9708-019B960494DF}">
+              <a14:hiddenLine xmlns:a14="http://schemas.microsoft.com/office/drawing/2010/main" w="9525">
+                <a:solidFill>
+                  <a:schemeClr val="tx1"/>
+                </a:solidFill>
+                <a:miter lim="800000"/>
+                <a:headEnd/>
+                <a:tailEnd/>
+              </a14:hiddenLine>
+            </a:ext>
+            <a:ext uri="{AF507438-7753-43E0-B8FC-AC1667EBCBE1}">
+              <a14:hiddenEffects xmlns:a14="http://schemas.microsoft.com/office/drawing/2010/main">
+                <a:effectLst>
+                  <a:outerShdw dist="35921" dir="2700000" algn="ctr" rotWithShape="0">
+                    <a:schemeClr val="bg2"/>
+                  </a:outerShdw>
+                </a:effectLst>
+              </a14:hiddenEffects>
+            </a:ext>
+          </a:extLst>
+        </p:spPr>
+        <p:txBody>
+          <a:bodyPr vert="horz" wrap="square" lIns="91440" tIns="45720" rIns="91440" bIns="45720" numCol="1" anchor="ctr" anchorCtr="0" compatLnSpc="1">
+            <a:prstTxWarp prst="textNoShape">
+              <a:avLst/>
+            </a:prstTxWarp>
+          </a:bodyPr>
+          <a:lstStyle>
+            <a:lvl1pPr algn="ctr" rtl="0" eaLnBrk="0" fontAlgn="base" hangingPunct="0">
+              <a:spcBef>
+                <a:spcPct val="0"/>
+              </a:spcBef>
+              <a:spcAft>
+                <a:spcPct val="0"/>
+              </a:spcAft>
+              <a:defRPr sz="2400" b="1">
+                <a:solidFill>
+                  <a:srgbClr val="990000"/>
+                </a:solidFill>
+                <a:latin typeface="+mj-lt"/>
+                <a:ea typeface="+mj-ea"/>
+                <a:cs typeface="+mj-cs"/>
+              </a:defRPr>
+            </a:lvl1pPr>
+            <a:lvl2pPr algn="ctr" rtl="0" eaLnBrk="0" fontAlgn="base" hangingPunct="0">
+              <a:spcBef>
+                <a:spcPct val="0"/>
+              </a:spcBef>
+              <a:spcAft>
+                <a:spcPct val="0"/>
+              </a:spcAft>
+              <a:defRPr sz="2400" b="1">
+                <a:solidFill>
+                  <a:srgbClr val="990000"/>
+                </a:solidFill>
+                <a:latin typeface="Arial" pitchFamily="34" charset="0"/>
+              </a:defRPr>
+            </a:lvl2pPr>
+            <a:lvl3pPr algn="ctr" rtl="0" eaLnBrk="0" fontAlgn="base" hangingPunct="0">
+              <a:spcBef>
+                <a:spcPct val="0"/>
+              </a:spcBef>
+              <a:spcAft>
+                <a:spcPct val="0"/>
+              </a:spcAft>
+              <a:defRPr sz="2400" b="1">
+                <a:solidFill>
+                  <a:srgbClr val="990000"/>
+                </a:solidFill>
+                <a:latin typeface="Arial" pitchFamily="34" charset="0"/>
+              </a:defRPr>
+            </a:lvl3pPr>
+            <a:lvl4pPr algn="ctr" rtl="0" eaLnBrk="0" fontAlgn="base" hangingPunct="0">
+              <a:spcBef>
+                <a:spcPct val="0"/>
+              </a:spcBef>
+              <a:spcAft>
+                <a:spcPct val="0"/>
+              </a:spcAft>
+              <a:defRPr sz="2400" b="1">
+                <a:solidFill>
+                  <a:srgbClr val="990000"/>
+                </a:solidFill>
+                <a:latin typeface="Arial" pitchFamily="34" charset="0"/>
+              </a:defRPr>
+            </a:lvl4pPr>
+            <a:lvl5pPr algn="ctr" rtl="0" eaLnBrk="0" fontAlgn="base" hangingPunct="0">
+              <a:spcBef>
+                <a:spcPct val="0"/>
+              </a:spcBef>
+              <a:spcAft>
+                <a:spcPct val="0"/>
+              </a:spcAft>
+              <a:defRPr sz="2400" b="1">
+                <a:solidFill>
+                  <a:srgbClr val="990000"/>
+                </a:solidFill>
+                <a:latin typeface="Arial" pitchFamily="34" charset="0"/>
+              </a:defRPr>
+            </a:lvl5pPr>
+            <a:lvl6pPr marL="457200" algn="ctr" rtl="0" fontAlgn="base">
+              <a:spcBef>
+                <a:spcPct val="0"/>
+              </a:spcBef>
+              <a:spcAft>
+                <a:spcPct val="0"/>
+              </a:spcAft>
+              <a:defRPr sz="2400" b="1">
+                <a:solidFill>
+                  <a:srgbClr val="990000"/>
+                </a:solidFill>
+                <a:latin typeface="Arial" pitchFamily="34" charset="0"/>
+              </a:defRPr>
+            </a:lvl6pPr>
+            <a:lvl7pPr marL="914400" algn="ctr" rtl="0" fontAlgn="base">
+              <a:spcBef>
+                <a:spcPct val="0"/>
+              </a:spcBef>
+              <a:spcAft>
+                <a:spcPct val="0"/>
+              </a:spcAft>
+              <a:defRPr sz="2400" b="1">
+                <a:solidFill>
+                  <a:srgbClr val="990000"/>
+                </a:solidFill>
+                <a:latin typeface="Arial" pitchFamily="34" charset="0"/>
+              </a:defRPr>
+            </a:lvl7pPr>
+            <a:lvl8pPr marL="1371600" algn="ctr" rtl="0" fontAlgn="base">
+              <a:spcBef>
+                <a:spcPct val="0"/>
+              </a:spcBef>
+              <a:spcAft>
+                <a:spcPct val="0"/>
+              </a:spcAft>
+              <a:defRPr sz="2400" b="1">
+                <a:solidFill>
+                  <a:srgbClr val="990000"/>
+                </a:solidFill>
+                <a:latin typeface="Arial" pitchFamily="34" charset="0"/>
+              </a:defRPr>
+            </a:lvl8pPr>
+            <a:lvl9pPr marL="1828800" algn="ctr" rtl="0" fontAlgn="base">
+              <a:spcBef>
+                <a:spcPct val="0"/>
+              </a:spcBef>
+              <a:spcAft>
+                <a:spcPct val="0"/>
+              </a:spcAft>
+              <a:defRPr sz="2400" b="1">
+                <a:solidFill>
+                  <a:srgbClr val="990000"/>
+                </a:solidFill>
+                <a:latin typeface="Arial" pitchFamily="34" charset="0"/>
+              </a:defRPr>
+            </a:lvl9pPr>
+          </a:lstStyle>
+          <a:p>
+            <a:pPr eaLnBrk="1" hangingPunct="1"/>
+            <a:r>
+              <a:rPr lang="en-GB" sz="2800" kern="0" dirty="0" smtClean="0"/>
+              <a:t>VECTO 2.1</a:t>
+            </a:r>
+            <a:endParaRPr lang="en-GB" sz="2800" kern="0" dirty="0"/>
+          </a:p>
+        </p:txBody>
+      </p:sp>
+      <p:sp>
+        <p:nvSpPr>
+          <p:cNvPr id="6" name="Textfeld 5"/>
+          <p:cNvSpPr txBox="1"/>
+          <p:nvPr/>
+        </p:nvSpPr>
+        <p:spPr>
+          <a:xfrm>
+            <a:off x="251522" y="1456615"/>
+            <a:ext cx="8496944" cy="3708708"/>
+          </a:xfrm>
+          <a:prstGeom prst="rect">
+            <a:avLst/>
+          </a:prstGeom>
+          <a:noFill/>
+          <a:ln>
+            <a:noFill/>
+          </a:ln>
+        </p:spPr>
+        <p:txBody>
+          <a:bodyPr wrap="square" rtlCol="0">
+            <a:spAutoFit/>
+          </a:bodyPr>
+          <a:lstStyle/>
+          <a:p>
+            <a:pPr marL="342900" indent="-342900" algn="l">
+              <a:lnSpc>
+                <a:spcPct val="150000"/>
+              </a:lnSpc>
+              <a:spcBef>
+                <a:spcPts val="600"/>
+              </a:spcBef>
+              <a:buFont typeface="Arial" pitchFamily="34" charset="0"/>
+              <a:buChar char="•"/>
+            </a:pPr>
+            <a:r>
+              <a:rPr lang="en-GB" dirty="0" smtClean="0"/>
+              <a:t>New </a:t>
+            </a:r>
+            <a:r>
+              <a:rPr lang="en-GB" dirty="0"/>
+              <a:t>AT/TC </a:t>
+            </a:r>
+            <a:r>
+              <a:rPr lang="en-GB" dirty="0" smtClean="0"/>
+              <a:t>options: </a:t>
+            </a:r>
+          </a:p>
+          <a:p>
+            <a:pPr marL="800100" lvl="1" indent="-342900" algn="l">
+              <a:lnSpc>
+                <a:spcPct val="150000"/>
+              </a:lnSpc>
+              <a:spcBef>
+                <a:spcPts val="600"/>
+              </a:spcBef>
+              <a:buFont typeface="Arial" pitchFamily="34" charset="0"/>
+              <a:buChar char="•"/>
+            </a:pPr>
+            <a:r>
+              <a:rPr lang="en-GB" sz="1400" b="0" dirty="0" smtClean="0"/>
+              <a:t>Limit engine rpm in torque converter operation acc. ≥ </a:t>
+            </a:r>
+            <a:r>
+              <a:rPr lang="en-GB" sz="1400" b="0" dirty="0" err="1" smtClean="0"/>
+              <a:t>acc</a:t>
+            </a:r>
+            <a:r>
+              <a:rPr lang="en-GB" sz="1400" b="0" baseline="-25000" dirty="0" err="1" smtClean="0"/>
+              <a:t>min</a:t>
+            </a:r>
+            <a:endParaRPr lang="en-GB" sz="1400" b="0" dirty="0" smtClean="0"/>
+          </a:p>
+          <a:p>
+            <a:pPr marL="800100" lvl="1" indent="-342900" algn="l">
+              <a:lnSpc>
+                <a:spcPct val="150000"/>
+              </a:lnSpc>
+              <a:spcBef>
+                <a:spcPts val="600"/>
+              </a:spcBef>
+              <a:buFont typeface="Arial" pitchFamily="34" charset="0"/>
+              <a:buChar char="•"/>
+            </a:pPr>
+            <a:r>
+              <a:rPr lang="en-GB" sz="1400" b="0" dirty="0" smtClean="0"/>
+              <a:t>Shift up (C-to-L, L-to-L) </a:t>
+            </a:r>
+            <a:r>
+              <a:rPr lang="en-GB" sz="1400" b="0" dirty="0"/>
+              <a:t>if acc. ≥ </a:t>
+            </a:r>
+            <a:r>
+              <a:rPr lang="en-GB" sz="1400" b="0" dirty="0" err="1" smtClean="0"/>
+              <a:t>acc</a:t>
+            </a:r>
+            <a:r>
+              <a:rPr lang="en-GB" sz="1400" b="0" baseline="-25000" dirty="0" err="1" smtClean="0"/>
+              <a:t>min</a:t>
+            </a:r>
+            <a:r>
+              <a:rPr lang="en-GB" sz="1400" b="0" dirty="0" smtClean="0"/>
+              <a:t> and next-gear-rpm &gt; threshold</a:t>
+            </a:r>
+          </a:p>
+          <a:p>
+            <a:pPr marL="800100" lvl="1" indent="-342900" algn="l">
+              <a:lnSpc>
+                <a:spcPct val="150000"/>
+              </a:lnSpc>
+              <a:spcBef>
+                <a:spcPts val="600"/>
+              </a:spcBef>
+              <a:buFont typeface="Arial" pitchFamily="34" charset="0"/>
+              <a:buChar char="•"/>
+            </a:pPr>
+            <a:r>
+              <a:rPr lang="en-GB" sz="1400" b="0" dirty="0" smtClean="0"/>
+              <a:t>rpm limit [1/min] and </a:t>
+            </a:r>
+            <a:r>
+              <a:rPr lang="en-GB" sz="1400" b="0" dirty="0" err="1" smtClean="0"/>
+              <a:t>acc</a:t>
+            </a:r>
+            <a:r>
+              <a:rPr lang="en-GB" sz="1400" b="0" baseline="-25000" dirty="0" err="1" smtClean="0"/>
+              <a:t>min</a:t>
+            </a:r>
+            <a:r>
+              <a:rPr lang="en-GB" sz="1400" b="0" dirty="0" smtClean="0"/>
+              <a:t> [m/s²] parameters are currently user-defined</a:t>
+            </a:r>
+          </a:p>
+          <a:p>
+            <a:pPr marL="800100" lvl="1" indent="-342900" algn="l">
+              <a:lnSpc>
+                <a:spcPct val="150000"/>
+              </a:lnSpc>
+              <a:spcBef>
+                <a:spcPts val="600"/>
+              </a:spcBef>
+              <a:buFont typeface="Arial" pitchFamily="34" charset="0"/>
+              <a:buChar char="•"/>
+            </a:pPr>
+            <a:r>
+              <a:rPr lang="en-GB" sz="1400" b="0" dirty="0"/>
+              <a:t>C-to-C up-shift condition based on N80h engine speed (instead of N95h)</a:t>
+            </a:r>
+            <a:endParaRPr lang="en-GB" sz="1400" b="0" dirty="0" smtClean="0"/>
+          </a:p>
+          <a:p>
+            <a:pPr marL="342900" indent="-342900" algn="l">
+              <a:lnSpc>
+                <a:spcPct val="150000"/>
+              </a:lnSpc>
+              <a:spcBef>
+                <a:spcPts val="600"/>
+              </a:spcBef>
+              <a:buFont typeface="Arial" pitchFamily="34" charset="0"/>
+              <a:buChar char="•"/>
+            </a:pPr>
+            <a:r>
+              <a:rPr lang="en-GB" dirty="0" err="1" smtClean="0"/>
+              <a:t>P</a:t>
+            </a:r>
+            <a:r>
+              <a:rPr lang="en-GB" baseline="-25000" dirty="0" err="1" smtClean="0"/>
+              <a:t>wheel</a:t>
+            </a:r>
+            <a:r>
+              <a:rPr lang="en-GB" dirty="0" smtClean="0"/>
+              <a:t> input (</a:t>
+            </a:r>
+            <a:r>
+              <a:rPr lang="en-GB" dirty="0" err="1" smtClean="0"/>
+              <a:t>SiCo</a:t>
+            </a:r>
+            <a:r>
+              <a:rPr lang="en-GB" dirty="0" smtClean="0"/>
+              <a:t> test mode)</a:t>
+            </a:r>
+          </a:p>
+          <a:p>
+            <a:pPr marL="800100" lvl="1" indent="-342900" algn="l">
+              <a:lnSpc>
+                <a:spcPct val="150000"/>
+              </a:lnSpc>
+              <a:spcBef>
+                <a:spcPts val="600"/>
+              </a:spcBef>
+              <a:buFont typeface="Arial" pitchFamily="34" charset="0"/>
+              <a:buChar char="•"/>
+            </a:pPr>
+            <a:r>
+              <a:rPr lang="en-GB" sz="1400" b="0" dirty="0" err="1" smtClean="0"/>
+              <a:t>P</a:t>
+            </a:r>
+            <a:r>
+              <a:rPr lang="en-GB" sz="1400" b="0" baseline="-25000" dirty="0" err="1" smtClean="0"/>
+              <a:t>wheel</a:t>
+            </a:r>
+            <a:r>
+              <a:rPr lang="en-GB" sz="1400" b="0" dirty="0" smtClean="0"/>
+              <a:t> as cycle input</a:t>
+            </a:r>
+          </a:p>
+          <a:p>
+            <a:pPr marL="800100" lvl="1" indent="-342900" algn="l">
+              <a:lnSpc>
+                <a:spcPct val="150000"/>
+              </a:lnSpc>
+              <a:spcBef>
+                <a:spcPts val="600"/>
+              </a:spcBef>
+              <a:buFont typeface="Arial" pitchFamily="34" charset="0"/>
+              <a:buChar char="•"/>
+            </a:pPr>
+            <a:r>
+              <a:rPr lang="en-GB" sz="1400" b="0" dirty="0" smtClean="0"/>
+              <a:t>Overwrites power calculation</a:t>
+            </a:r>
+          </a:p>
+          <a:p>
+            <a:pPr marL="800100" lvl="1" indent="-342900" algn="l">
+              <a:lnSpc>
+                <a:spcPct val="150000"/>
+              </a:lnSpc>
+              <a:spcBef>
+                <a:spcPts val="600"/>
+              </a:spcBef>
+              <a:buFont typeface="Arial" pitchFamily="34" charset="0"/>
+              <a:buChar char="•"/>
+            </a:pPr>
+            <a:r>
+              <a:rPr lang="en-GB" sz="1400" b="0" dirty="0" smtClean="0"/>
+              <a:t>VECTO only calculates power train losses, engine torque/rpm and fuel consumption</a:t>
+            </a:r>
+          </a:p>
+        </p:txBody>
+      </p:sp>
+    </p:spTree>
+    <p:extLst>
+      <p:ext uri="{BB962C8B-B14F-4D97-AF65-F5344CB8AC3E}">
+        <p14:creationId xmlns:p14="http://schemas.microsoft.com/office/powerpoint/2010/main" val="1818809352"/>
+      </p:ext>
+    </p:extLst>
+  </p:cSld>
+  <p:clrMapOvr>
+    <a:masterClrMapping/>
+  </p:clrMapOvr>
+  <p:timing>
+    <p:tnLst>
+      <p:par>
+        <p:cTn id="1" dur="indefinite" restart="never" nodeType="tmRoot"/>
+      </p:par>
+    </p:tnLst>
+  </p:timing>
+</p:sld>
+</file>
+
+<file path=ppt/slides/slide11.xml><?xml version="1.0" encoding="utf-8"?>
+<p:sld xmlns:a="http://schemas.openxmlformats.org/drawingml/2006/main" xmlns:r="http://schemas.openxmlformats.org/officeDocument/2006/relationships" xmlns:p="http://schemas.openxmlformats.org/presentationml/2006/main">
+  <p:cSld>
+    <p:spTree>
+      <p:nvGrpSpPr>
+        <p:cNvPr id="1" name=""/>
+        <p:cNvGrpSpPr/>
+        <p:nvPr/>
+      </p:nvGrpSpPr>
+      <p:grpSpPr>
+        <a:xfrm>
+          <a:off x="0" y="0"/>
+          <a:ext cx="0" cy="0"/>
+          <a:chOff x="0" y="0"/>
+          <a:chExt cx="0" cy="0"/>
+        </a:xfrm>
+      </p:grpSpPr>
       <p:pic>
         <p:nvPicPr>
           <p:cNvPr id="1031" name="Picture 7"/>
@@ -6013,7 +6466,7 @@
 </p:sld>
 </file>
 
-<file path=ppt/slides/slide11.xml><?xml version="1.0" encoding="utf-8"?>
+<file path=ppt/slides/slide12.xml><?xml version="1.0" encoding="utf-8"?>
 <p:sld xmlns:a="http://schemas.openxmlformats.org/drawingml/2006/main" xmlns:r="http://schemas.openxmlformats.org/officeDocument/2006/relationships" xmlns:p="http://schemas.openxmlformats.org/presentationml/2006/main">
   <p:cSld>
     <p:spTree>
@@ -6597,7 +7050,7 @@
 </p:sld>
 </file>
 
-<file path=ppt/slides/slide12.xml><?xml version="1.0" encoding="utf-8"?>
+<file path=ppt/slides/slide13.xml><?xml version="1.0" encoding="utf-8"?>
 <p:sld xmlns:a="http://schemas.openxmlformats.org/drawingml/2006/main" xmlns:r="http://schemas.openxmlformats.org/officeDocument/2006/relationships" xmlns:p="http://schemas.openxmlformats.org/presentationml/2006/main">
   <p:cSld>
     <p:spTree>
@@ -6995,7 +7448,7 @@
 </p:sld>
 </file>
 
-<file path=ppt/slides/slide13.xml><?xml version="1.0" encoding="utf-8"?>
+<file path=ppt/slides/slide14.xml><?xml version="1.0" encoding="utf-8"?>
 <p:sld xmlns:a="http://schemas.openxmlformats.org/drawingml/2006/main" xmlns:r="http://schemas.openxmlformats.org/officeDocument/2006/relationships" xmlns:p="http://schemas.openxmlformats.org/presentationml/2006/main">
   <p:cSld>
     <p:spTree>
@@ -7483,7 +7936,7 @@
 </p:sld>
 </file>
 
-<file path=ppt/slides/slide14.xml><?xml version="1.0" encoding="utf-8"?>
+<file path=ppt/slides/slide15.xml><?xml version="1.0" encoding="utf-8"?>
 <p:sld xmlns:a="http://schemas.openxmlformats.org/drawingml/2006/main" xmlns:r="http://schemas.openxmlformats.org/officeDocument/2006/relationships" xmlns:p="http://schemas.openxmlformats.org/presentationml/2006/main">
   <p:cSld>
     <p:spTree>
@@ -8265,7 +8718,7 @@
 </p:sld>
 </file>
 
-<file path=ppt/slides/slide15.xml><?xml version="1.0" encoding="utf-8"?>
+<file path=ppt/slides/slide16.xml><?xml version="1.0" encoding="utf-8"?>
 <p:sld xmlns:a="http://schemas.openxmlformats.org/drawingml/2006/main" xmlns:r="http://schemas.openxmlformats.org/officeDocument/2006/relationships" xmlns:p="http://schemas.openxmlformats.org/presentationml/2006/main">
   <p:cSld>
     <p:spTree>
@@ -8320,7 +8773,7 @@
         <p:spPr>
           <a:xfrm>
             <a:off x="179514" y="1414512"/>
-            <a:ext cx="8784976" cy="3677930"/>
+            <a:ext cx="8784976" cy="2108269"/>
           </a:xfrm>
           <a:prstGeom prst="rect">
             <a:avLst/>
@@ -8516,169 +8969,6 @@
               <a:buChar char="•"/>
             </a:pPr>
             <a:endParaRPr lang="en-GB" sz="1200" b="0" dirty="0"/>
-          </a:p>
-          <a:p>
-            <a:pPr algn="l">
-              <a:spcBef>
-                <a:spcPts val="600"/>
-              </a:spcBef>
-            </a:pPr>
-            <a:r>
-              <a:rPr lang="en-GB" sz="1200" dirty="0" smtClean="0"/>
-              <a:t>VECTO </a:t>
-            </a:r>
-            <a:r>
-              <a:rPr lang="en-GB" sz="1200" dirty="0"/>
-              <a:t>2.0.4-beta4_Test (Test Release)</a:t>
-            </a:r>
-          </a:p>
-          <a:p>
-            <a:pPr marL="171450" indent="-171450" algn="l">
-              <a:spcBef>
-                <a:spcPts val="600"/>
-              </a:spcBef>
-              <a:buFont typeface="Arial" pitchFamily="34" charset="0"/>
-              <a:buChar char="•"/>
-            </a:pPr>
-            <a:r>
-              <a:rPr lang="en-GB" sz="1200" b="0" dirty="0" smtClean="0"/>
-              <a:t>Transmission </a:t>
-            </a:r>
-            <a:r>
-              <a:rPr lang="en-GB" sz="1200" b="0" dirty="0"/>
-              <a:t>loss extrapolation Errors are now Warnings in Engineering Mode.</a:t>
-            </a:r>
-          </a:p>
-          <a:p>
-            <a:pPr marL="171450" indent="-171450" algn="l">
-              <a:spcBef>
-                <a:spcPts val="600"/>
-              </a:spcBef>
-              <a:buFont typeface="Arial" pitchFamily="34" charset="0"/>
-              <a:buChar char="•"/>
-            </a:pPr>
-            <a:r>
-              <a:rPr lang="en-GB" sz="1200" b="0" dirty="0" err="1" smtClean="0"/>
-              <a:t>Bugfix</a:t>
-            </a:r>
-            <a:r>
-              <a:rPr lang="en-GB" sz="1200" b="0" dirty="0"/>
-              <a:t>: Error in TC Iteration caused crash</a:t>
-            </a:r>
-          </a:p>
-          <a:p>
-            <a:pPr marL="171450" indent="-171450" algn="l">
-              <a:spcBef>
-                <a:spcPts val="600"/>
-              </a:spcBef>
-              <a:buFont typeface="Arial" pitchFamily="34" charset="0"/>
-              <a:buChar char="•"/>
-            </a:pPr>
-            <a:r>
-              <a:rPr lang="en-GB" sz="1200" b="0" dirty="0" err="1" smtClean="0"/>
-              <a:t>Bugfix</a:t>
-            </a:r>
-            <a:r>
-              <a:rPr lang="en-GB" sz="1200" b="0" dirty="0"/>
-              <a:t>: Minimizing Graph window caused crash</a:t>
-            </a:r>
-          </a:p>
-          <a:p>
-            <a:pPr marL="171450" indent="-171450" algn="l">
-              <a:spcBef>
-                <a:spcPts val="600"/>
-              </a:spcBef>
-              <a:buFont typeface="Arial" pitchFamily="34" charset="0"/>
-              <a:buChar char="•"/>
-            </a:pPr>
-            <a:r>
-              <a:rPr lang="en-GB" sz="1200" b="0" dirty="0" smtClean="0"/>
-              <a:t>Fixed </a:t>
-            </a:r>
-            <a:r>
-              <a:rPr lang="en-GB" sz="1200" b="0" dirty="0"/>
-              <a:t>error in cycle conversion</a:t>
-            </a:r>
-          </a:p>
-          <a:p>
-            <a:pPr marL="171450" indent="-171450" algn="l">
-              <a:spcBef>
-                <a:spcPts val="600"/>
-              </a:spcBef>
-              <a:buFont typeface="Arial" pitchFamily="34" charset="0"/>
-              <a:buChar char="•"/>
-            </a:pPr>
-            <a:r>
-              <a:rPr lang="en-GB" sz="1200" b="0" dirty="0" smtClean="0"/>
-              <a:t>Errors </a:t>
-            </a:r>
-            <a:r>
-              <a:rPr lang="en-GB" sz="1200" b="0" dirty="0"/>
-              <a:t>if full load curve is too "short"</a:t>
-            </a:r>
-            <a:endParaRPr lang="en-GB" sz="1200" b="0" dirty="0" smtClean="0"/>
-          </a:p>
-        </p:txBody>
-      </p:sp>
-      <p:sp>
-        <p:nvSpPr>
-          <p:cNvPr id="2" name="Textfeld 1"/>
-          <p:cNvSpPr txBox="1"/>
-          <p:nvPr/>
-        </p:nvSpPr>
-        <p:spPr>
-          <a:xfrm>
-            <a:off x="107504" y="5877272"/>
-            <a:ext cx="8928992" cy="523220"/>
-          </a:xfrm>
-          <a:prstGeom prst="rect">
-            <a:avLst/>
-          </a:prstGeom>
-          <a:noFill/>
-          <a:ln>
-            <a:noFill/>
-          </a:ln>
-        </p:spPr>
-        <p:txBody>
-          <a:bodyPr wrap="square" rtlCol="0">
-            <a:spAutoFit/>
-          </a:bodyPr>
-          <a:lstStyle/>
-          <a:p>
-            <a:pPr algn="l">
-              <a:spcBef>
-                <a:spcPts val="0"/>
-              </a:spcBef>
-            </a:pPr>
-            <a:r>
-              <a:rPr lang="en-GB" sz="1400" b="0" i="1" dirty="0"/>
-              <a:t>Changelog </a:t>
-            </a:r>
-            <a:r>
-              <a:rPr lang="en-GB" sz="1400" b="0" i="1" dirty="0" smtClean="0"/>
-              <a:t>since version 2.0.4-beta3. For full changelog see VECTO Main Form &gt; Help &gt; User Manual</a:t>
-            </a:r>
-          </a:p>
-          <a:p>
-            <a:pPr algn="l">
-              <a:spcBef>
-                <a:spcPts val="0"/>
-              </a:spcBef>
-            </a:pPr>
-            <a:r>
-              <a:rPr lang="en-GB" sz="1400" b="0" i="1" dirty="0" smtClean="0"/>
-              <a:t>or </a:t>
-            </a:r>
-            <a:r>
-              <a:rPr lang="en-GB" sz="1400" b="0" i="1" dirty="0" smtClean="0">
-                <a:hlinkClick r:id="rId2"/>
-              </a:rPr>
-              <a:t>CITnet</a:t>
-            </a:r>
-            <a:r>
-              <a:rPr lang="en-GB" sz="1400" b="0" i="1" dirty="0" smtClean="0"/>
-              <a:t>.</a:t>
-            </a:r>
           </a:p>
         </p:txBody>
       </p:sp>
@@ -8909,11 +9199,7 @@
             <a:pPr eaLnBrk="1" hangingPunct="1"/>
             <a:r>
               <a:rPr lang="en-GB" sz="2800" kern="0" dirty="0" smtClean="0"/>
-              <a:t>VECTO </a:t>
-            </a:r>
-            <a:r>
-              <a:rPr lang="en-GB" sz="2800" kern="0" dirty="0" smtClean="0"/>
-              <a:t>2.2</a:t>
+              <a:t>VECTO 2.2</a:t>
             </a:r>
             <a:endParaRPr lang="en-GB" sz="2800" kern="0" dirty="0"/>
           </a:p>
@@ -9679,7 +9965,6 @@
               <a:rPr lang="en-GB" sz="1400" b="0" dirty="0" smtClean="0"/>
               <a:t>.</a:t>
             </a:r>
-            <a:endParaRPr lang="en-GB" sz="1400" b="0" dirty="0" smtClean="0"/>
           </a:p>
         </p:txBody>
       </p:sp>
@@ -10177,8 +10462,8 @@
         </p:nvSpPr>
         <p:spPr>
           <a:xfrm>
-            <a:off x="251518" y="1700808"/>
-            <a:ext cx="4608514" cy="1631216"/>
+            <a:off x="251518" y="1870373"/>
+            <a:ext cx="4608514" cy="1846659"/>
           </a:xfrm>
           <a:prstGeom prst="rect">
             <a:avLst/>
@@ -10219,8 +10504,13 @@
             </a:r>
             <a:r>
               <a:rPr lang="en-GB" sz="1400" dirty="0" smtClean="0"/>
-              <a:t> product, which can now be inserted without separating.</a:t>
-            </a:r>
+              <a:t> product, which can now be inserted </a:t>
+            </a:r>
+            <a:r>
+              <a:rPr lang="en-GB" sz="1400" dirty="0" smtClean="0"/>
+              <a:t>into VECTO without separating.</a:t>
+            </a:r>
+            <a:endParaRPr lang="en-GB" sz="1400" dirty="0" smtClean="0"/>
           </a:p>
           <a:p>
             <a:pPr marL="342900" indent="-342900" algn="l">
@@ -10921,7 +11211,7 @@
         <p:spPr>
           <a:xfrm>
             <a:off x="107504" y="1986142"/>
-            <a:ext cx="1417311" cy="307777"/>
+            <a:ext cx="3286412" cy="307777"/>
           </a:xfrm>
           <a:prstGeom prst="rect">
             <a:avLst/>
@@ -10944,7 +11234,7 @@
             </a:pPr>
             <a:r>
               <a:rPr lang="en-GB" sz="1400" b="0" dirty="0" smtClean="0"/>
-              <a:t>VECTO-Engine</a:t>
+              <a:t>VECTO-Engine (distributed separately)</a:t>
             </a:r>
             <a:endParaRPr lang="en-GB" sz="1400" b="0" dirty="0" smtClean="0"/>
           </a:p>
@@ -10984,7 +11274,6 @@
               <a:rPr lang="en-GB" sz="1400" b="0" dirty="0" smtClean="0"/>
               <a:t>Engine Editor</a:t>
             </a:r>
-            <a:endParaRPr lang="en-GB" sz="1400" b="0" dirty="0" smtClean="0"/>
           </a:p>
         </p:txBody>
       </p:sp>
@@ -11726,6 +12015,290 @@
           <a:chExt cx="0" cy="0"/>
         </a:xfrm>
       </p:grpSpPr>
+      <p:sp>
+        <p:nvSpPr>
+          <p:cNvPr id="2" name="Rectangle 3"/>
+          <p:cNvSpPr>
+            <a:spLocks noGrp="1" noChangeArrowheads="1"/>
+          </p:cNvSpPr>
+          <p:nvPr>
+            <p:ph type="title" idx="4294967295"/>
+          </p:nvPr>
+        </p:nvSpPr>
+        <p:spPr>
+          <a:xfrm>
+            <a:off x="0" y="548680"/>
+            <a:ext cx="9144000" cy="346075"/>
+          </a:xfrm>
+        </p:spPr>
+        <p:txBody>
+          <a:bodyPr/>
+          <a:lstStyle/>
+          <a:p>
+            <a:pPr eaLnBrk="1" hangingPunct="1"/>
+            <a:r>
+              <a:rPr lang="en-GB" sz="2800" dirty="0" smtClean="0"/>
+              <a:t>Full Changelog </a:t>
+            </a:r>
+            <a:r>
+              <a:rPr lang="en-GB" sz="2800" dirty="0" smtClean="0"/>
+              <a:t>since V2.1.4</a:t>
+            </a:r>
+            <a:endParaRPr lang="en-GB" sz="2800" dirty="0"/>
+          </a:p>
+        </p:txBody>
+      </p:sp>
+      <p:sp>
+        <p:nvSpPr>
+          <p:cNvPr id="3" name="Rechteck 2"/>
+          <p:cNvSpPr/>
+          <p:nvPr/>
+        </p:nvSpPr>
+        <p:spPr>
+          <a:xfrm>
+            <a:off x="251520" y="1305911"/>
+            <a:ext cx="8712968" cy="3877985"/>
+          </a:xfrm>
+          <a:prstGeom prst="rect">
+            <a:avLst/>
+          </a:prstGeom>
+        </p:spPr>
+        <p:txBody>
+          <a:bodyPr wrap="square">
+            <a:spAutoFit/>
+          </a:bodyPr>
+          <a:lstStyle/>
+          <a:p>
+            <a:pPr algn="l"/>
+            <a:r>
+              <a:rPr lang="en-GB" sz="1200" dirty="0"/>
+              <a:t>VECTO 2.2</a:t>
+            </a:r>
+          </a:p>
+          <a:p>
+            <a:pPr marL="171450" indent="-171450" algn="l">
+              <a:buFont typeface="Arial" panose="020B0604020202020204" pitchFamily="34" charset="0"/>
+              <a:buChar char="•"/>
+            </a:pPr>
+            <a:r>
+              <a:rPr lang="en-GB" sz="1200" b="0" dirty="0" err="1"/>
+              <a:t>Bugfix</a:t>
+            </a:r>
+            <a:r>
+              <a:rPr lang="en-GB" sz="1200" b="0" dirty="0"/>
+              <a:t>: Error in Declaration Mode Pneumatic System aux power calculation ([kW] were interpreted as [W])</a:t>
+            </a:r>
+          </a:p>
+          <a:p>
+            <a:pPr marL="171450" indent="-171450" algn="l">
+              <a:buFont typeface="Arial" panose="020B0604020202020204" pitchFamily="34" charset="0"/>
+              <a:buChar char="•"/>
+            </a:pPr>
+            <a:r>
+              <a:rPr lang="en-GB" sz="1200" b="0" dirty="0" err="1"/>
+              <a:t>Bugfix</a:t>
+            </a:r>
+            <a:r>
+              <a:rPr lang="en-GB" sz="1200" b="0" dirty="0"/>
+              <a:t>: Error in Declaration Mode Electric System aux power calculation</a:t>
+            </a:r>
+          </a:p>
+          <a:p>
+            <a:pPr marL="171450" indent="-171450" algn="l">
+              <a:buFont typeface="Arial" panose="020B0604020202020204" pitchFamily="34" charset="0"/>
+              <a:buChar char="•"/>
+            </a:pPr>
+            <a:r>
+              <a:rPr lang="en-GB" sz="1200" b="0" dirty="0"/>
+              <a:t>Moved gear-specific Full Load Curves to Gearbox File</a:t>
+            </a:r>
+          </a:p>
+          <a:p>
+            <a:pPr marL="171450" indent="-171450" algn="l">
+              <a:buFont typeface="Arial" panose="020B0604020202020204" pitchFamily="34" charset="0"/>
+              <a:buChar char="•"/>
+            </a:pPr>
+            <a:r>
+              <a:rPr lang="en-GB" sz="1200" b="0" dirty="0"/>
+              <a:t>Combined Drag Coefficient * Cross Sectional Area in one input parameter</a:t>
+            </a:r>
+          </a:p>
+          <a:p>
+            <a:pPr marL="171450" indent="-171450" algn="l">
+              <a:buFont typeface="Arial" panose="020B0604020202020204" pitchFamily="34" charset="0"/>
+              <a:buChar char="•"/>
+            </a:pPr>
+            <a:r>
+              <a:rPr lang="en-GB" sz="1200" b="0" dirty="0"/>
+              <a:t>Updated .</a:t>
+            </a:r>
+            <a:r>
+              <a:rPr lang="en-GB" sz="1200" b="0" dirty="0" err="1"/>
+              <a:t>vgbx</a:t>
+            </a:r>
+            <a:r>
+              <a:rPr lang="en-GB" sz="1200" b="0" dirty="0"/>
+              <a:t> file format (Added gear-specific Full Load Curves)</a:t>
+            </a:r>
+          </a:p>
+          <a:p>
+            <a:pPr marL="171450" indent="-171450" algn="l">
+              <a:buFont typeface="Arial" panose="020B0604020202020204" pitchFamily="34" charset="0"/>
+              <a:buChar char="•"/>
+            </a:pPr>
+            <a:r>
+              <a:rPr lang="en-GB" sz="1200" b="0" dirty="0"/>
+              <a:t>Updated .</a:t>
+            </a:r>
+            <a:r>
+              <a:rPr lang="en-GB" sz="1200" b="0" dirty="0" err="1"/>
+              <a:t>veng</a:t>
+            </a:r>
+            <a:r>
+              <a:rPr lang="en-GB" sz="1200" b="0" dirty="0"/>
+              <a:t> file format (Removed gear-specific Full Load Curves)</a:t>
+            </a:r>
+          </a:p>
+          <a:p>
+            <a:pPr marL="171450" indent="-171450" algn="l">
+              <a:buFont typeface="Arial" panose="020B0604020202020204" pitchFamily="34" charset="0"/>
+              <a:buChar char="•"/>
+            </a:pPr>
+            <a:r>
+              <a:rPr lang="en-GB" sz="1200" b="0" dirty="0"/>
+              <a:t>Updated .</a:t>
+            </a:r>
+            <a:r>
+              <a:rPr lang="en-GB" sz="1200" b="0" dirty="0" err="1"/>
+              <a:t>vveh</a:t>
+            </a:r>
+            <a:r>
+              <a:rPr lang="en-GB" sz="1200" b="0" dirty="0"/>
+              <a:t> file format (Combined Drag Coefficient * Cross Sectional Area in one parameter)</a:t>
+            </a:r>
+          </a:p>
+          <a:p>
+            <a:pPr marL="171450" indent="-171450" algn="l">
+              <a:buFont typeface="Arial" panose="020B0604020202020204" pitchFamily="34" charset="0"/>
+              <a:buChar char="•"/>
+            </a:pPr>
+            <a:r>
+              <a:rPr lang="en-GB" sz="1200" b="0" dirty="0"/>
+              <a:t>Updated Generic Vehicles (new file formats)</a:t>
+            </a:r>
+          </a:p>
+          <a:p>
+            <a:pPr marL="171450" indent="-171450" algn="l">
+              <a:buFont typeface="Arial" panose="020B0604020202020204" pitchFamily="34" charset="0"/>
+              <a:buChar char="•"/>
+            </a:pPr>
+            <a:r>
+              <a:rPr lang="en-GB" sz="1200" b="0" dirty="0"/>
+              <a:t>Removed WHTC Correction Factor Calculation. Now in external tool, VECTO-Engine.</a:t>
+            </a:r>
+          </a:p>
+          <a:p>
+            <a:pPr marL="171450" indent="-171450" algn="l">
+              <a:buFont typeface="Arial" panose="020B0604020202020204" pitchFamily="34" charset="0"/>
+              <a:buChar char="•"/>
+            </a:pPr>
+            <a:r>
+              <a:rPr lang="en-GB" sz="1200" b="0" dirty="0"/>
+              <a:t>Test Options are now only available in Engineering Mode</a:t>
+            </a:r>
+          </a:p>
+          <a:p>
+            <a:pPr marL="171450" indent="-171450" algn="l">
+              <a:buFont typeface="Arial" panose="020B0604020202020204" pitchFamily="34" charset="0"/>
+              <a:buChar char="•"/>
+            </a:pPr>
+            <a:r>
+              <a:rPr lang="en-GB" sz="1200" b="0" dirty="0"/>
+              <a:t>Gearbox Editor now shows generic and user-defined shift polygons (if available)</a:t>
+            </a:r>
+          </a:p>
+          <a:p>
+            <a:pPr marL="171450" indent="-171450" algn="l">
+              <a:buFont typeface="Arial" panose="020B0604020202020204" pitchFamily="34" charset="0"/>
+              <a:buChar char="•"/>
+            </a:pPr>
+            <a:r>
+              <a:rPr lang="en-GB" sz="1200" b="0" dirty="0"/>
+              <a:t>Various small updates in GUI</a:t>
+            </a:r>
+          </a:p>
+          <a:p>
+            <a:pPr marL="171450" indent="-171450" algn="l">
+              <a:buFont typeface="Arial" panose="020B0604020202020204" pitchFamily="34" charset="0"/>
+              <a:buChar char="•"/>
+            </a:pPr>
+            <a:r>
+              <a:rPr lang="en-GB" sz="1200" b="0" dirty="0"/>
+              <a:t>Added 'Create JIRA Issue' </a:t>
+            </a:r>
+            <a:r>
+              <a:rPr lang="en-GB" sz="1200" b="0" dirty="0" smtClean="0"/>
+              <a:t>dialog</a:t>
+            </a:r>
+            <a:endParaRPr lang="en-GB" sz="1200" b="0" dirty="0"/>
+          </a:p>
+        </p:txBody>
+      </p:sp>
+      <p:sp>
+        <p:nvSpPr>
+          <p:cNvPr id="4" name="Textfeld 3"/>
+          <p:cNvSpPr txBox="1"/>
+          <p:nvPr/>
+        </p:nvSpPr>
+        <p:spPr>
+          <a:xfrm>
+            <a:off x="107504" y="6032321"/>
+            <a:ext cx="8928992" cy="276999"/>
+          </a:xfrm>
+          <a:prstGeom prst="rect">
+            <a:avLst/>
+          </a:prstGeom>
+          <a:noFill/>
+          <a:ln>
+            <a:noFill/>
+          </a:ln>
+        </p:spPr>
+        <p:txBody>
+          <a:bodyPr wrap="square" rtlCol="0">
+            <a:spAutoFit/>
+          </a:bodyPr>
+          <a:lstStyle/>
+          <a:p>
+            <a:pPr algn="l">
+              <a:spcBef>
+                <a:spcPts val="0"/>
+              </a:spcBef>
+            </a:pPr>
+            <a:r>
+              <a:rPr lang="en-GB" sz="1200" b="0" i="1" dirty="0" smtClean="0"/>
+              <a:t>For </a:t>
+            </a:r>
+            <a:r>
+              <a:rPr lang="en-GB" sz="1200" b="0" i="1" dirty="0" smtClean="0"/>
+              <a:t>full changelog see VECTO Main Form &gt; Help &gt; User </a:t>
+            </a:r>
+            <a:r>
+              <a:rPr lang="en-GB" sz="1200" b="0" i="1" dirty="0" smtClean="0"/>
+              <a:t>Manual or </a:t>
+            </a:r>
+            <a:r>
+              <a:rPr lang="en-GB" sz="1200" b="0" i="1" dirty="0" smtClean="0">
+                <a:hlinkClick r:id="rId2"/>
+              </a:rPr>
+              <a:t>CITnet</a:t>
+            </a:r>
+            <a:r>
+              <a:rPr lang="en-GB" sz="1200" b="0" i="1" dirty="0" smtClean="0"/>
+              <a:t>.</a:t>
+            </a:r>
+          </a:p>
+        </p:txBody>
+      </p:sp>
     </p:spTree>
     <p:extLst>
       <p:ext uri="{BB962C8B-B14F-4D97-AF65-F5344CB8AC3E}">
@@ -11747,6 +12320,437 @@
 </file>
 
 <file path=ppt/slides/slide8.xml><?xml version="1.0" encoding="utf-8"?>
+<p:sld xmlns:a="http://schemas.openxmlformats.org/drawingml/2006/main" xmlns:r="http://schemas.openxmlformats.org/officeDocument/2006/relationships" xmlns:p="http://schemas.openxmlformats.org/presentationml/2006/main">
+  <p:cSld>
+    <p:spTree>
+      <p:nvGrpSpPr>
+        <p:cNvPr id="1" name=""/>
+        <p:cNvGrpSpPr/>
+        <p:nvPr/>
+      </p:nvGrpSpPr>
+      <p:grpSpPr>
+        <a:xfrm>
+          <a:off x="0" y="0"/>
+          <a:ext cx="0" cy="0"/>
+          <a:chOff x="0" y="0"/>
+          <a:chExt cx="0" cy="0"/>
+        </a:xfrm>
+      </p:grpSpPr>
+      <p:sp>
+        <p:nvSpPr>
+          <p:cNvPr id="2" name="Rectangle 3"/>
+          <p:cNvSpPr>
+            <a:spLocks noGrp="1" noChangeArrowheads="1"/>
+          </p:cNvSpPr>
+          <p:nvPr>
+            <p:ph type="title" idx="4294967295"/>
+          </p:nvPr>
+        </p:nvSpPr>
+        <p:spPr>
+          <a:xfrm>
+            <a:off x="0" y="548680"/>
+            <a:ext cx="9144000" cy="346075"/>
+          </a:xfrm>
+        </p:spPr>
+        <p:txBody>
+          <a:bodyPr/>
+          <a:lstStyle/>
+          <a:p>
+            <a:pPr eaLnBrk="1" hangingPunct="1"/>
+            <a:r>
+              <a:rPr lang="en-GB" sz="2800" dirty="0" smtClean="0"/>
+              <a:t>Full Changelog </a:t>
+            </a:r>
+            <a:r>
+              <a:rPr lang="en-GB" sz="2800" dirty="0" smtClean="0"/>
+              <a:t>since V2.1</a:t>
+            </a:r>
+            <a:endParaRPr lang="en-GB" sz="2800" dirty="0"/>
+          </a:p>
+        </p:txBody>
+      </p:sp>
+      <p:sp>
+        <p:nvSpPr>
+          <p:cNvPr id="3" name="Rechteck 2"/>
+          <p:cNvSpPr/>
+          <p:nvPr/>
+        </p:nvSpPr>
+        <p:spPr>
+          <a:xfrm>
+            <a:off x="251520" y="1052736"/>
+            <a:ext cx="8712968" cy="5047536"/>
+          </a:xfrm>
+          <a:prstGeom prst="rect">
+            <a:avLst/>
+          </a:prstGeom>
+        </p:spPr>
+        <p:txBody>
+          <a:bodyPr wrap="square">
+            <a:spAutoFit/>
+          </a:bodyPr>
+          <a:lstStyle/>
+          <a:p>
+            <a:pPr algn="l"/>
+            <a:r>
+              <a:rPr lang="en-GB" sz="1200" dirty="0" smtClean="0"/>
+              <a:t>VECTO </a:t>
+            </a:r>
+            <a:r>
+              <a:rPr lang="en-GB" sz="1200" dirty="0"/>
+              <a:t>2.1.4</a:t>
+            </a:r>
+          </a:p>
+          <a:p>
+            <a:pPr marL="171450" indent="-171450" algn="l">
+              <a:spcBef>
+                <a:spcPts val="600"/>
+              </a:spcBef>
+              <a:buFont typeface="Arial" panose="020B0604020202020204" pitchFamily="34" charset="0"/>
+              <a:buChar char="•"/>
+            </a:pPr>
+            <a:r>
+              <a:rPr lang="en-GB" sz="1200" b="0" dirty="0" err="1"/>
+              <a:t>Bugfixes</a:t>
+            </a:r>
+            <a:r>
+              <a:rPr lang="en-GB" sz="1200" b="0" dirty="0"/>
+              <a:t> in start gear and (A)MT shift model</a:t>
+            </a:r>
+          </a:p>
+          <a:p>
+            <a:pPr marL="171450" indent="-171450" algn="l">
+              <a:spcBef>
+                <a:spcPts val="600"/>
+              </a:spcBef>
+              <a:buFont typeface="Arial" panose="020B0604020202020204" pitchFamily="34" charset="0"/>
+              <a:buChar char="•"/>
+            </a:pPr>
+            <a:r>
+              <a:rPr lang="en-GB" sz="1200" b="0" dirty="0"/>
+              <a:t>Updated Coach .</a:t>
+            </a:r>
+            <a:r>
+              <a:rPr lang="en-GB" sz="1200" b="0" dirty="0" err="1"/>
+              <a:t>vcdv</a:t>
+            </a:r>
+            <a:r>
+              <a:rPr lang="en-GB" sz="1200" b="0" dirty="0"/>
+              <a:t> file for higher speeds to avoid extrapolation</a:t>
+            </a:r>
+          </a:p>
+          <a:p>
+            <a:pPr marL="171450" indent="-171450" algn="l">
+              <a:spcBef>
+                <a:spcPts val="600"/>
+              </a:spcBef>
+              <a:buFont typeface="Arial" panose="020B0604020202020204" pitchFamily="34" charset="0"/>
+              <a:buChar char="•"/>
+            </a:pPr>
+            <a:r>
+              <a:rPr lang="en-GB" sz="1200" b="0" dirty="0"/>
+              <a:t>Renamed output "FC" to "FC-Map" for better clarification</a:t>
+            </a:r>
+          </a:p>
+          <a:p>
+            <a:pPr marL="171450" indent="-171450" algn="l">
+              <a:spcBef>
+                <a:spcPts val="600"/>
+              </a:spcBef>
+              <a:buFont typeface="Arial" panose="020B0604020202020204" pitchFamily="34" charset="0"/>
+              <a:buChar char="•"/>
+            </a:pPr>
+            <a:r>
+              <a:rPr lang="en-GB" sz="1200" b="0" dirty="0"/>
+              <a:t>Same header for g/h and g/km output</a:t>
+            </a:r>
+          </a:p>
+          <a:p>
+            <a:pPr marL="171450" indent="-171450" algn="l">
+              <a:spcBef>
+                <a:spcPts val="600"/>
+              </a:spcBef>
+              <a:buFont typeface="Arial" panose="020B0604020202020204" pitchFamily="34" charset="0"/>
+              <a:buChar char="•"/>
+            </a:pPr>
+            <a:r>
+              <a:rPr lang="en-GB" sz="1200" b="0" dirty="0"/>
+              <a:t>Reduced minimum turbine speed for 1C-to-2C AT up-shift condition from 900 to 700rpm.</a:t>
+            </a:r>
+          </a:p>
+          <a:p>
+            <a:pPr marL="171450" indent="-171450" algn="l">
+              <a:spcBef>
+                <a:spcPts val="600"/>
+              </a:spcBef>
+              <a:buFont typeface="Arial" panose="020B0604020202020204" pitchFamily="34" charset="0"/>
+              <a:buChar char="•"/>
+            </a:pPr>
+            <a:r>
+              <a:rPr lang="en-GB" sz="1200" b="0" dirty="0"/>
+              <a:t>Updated cross wind correction parameters to current White Book </a:t>
+            </a:r>
+            <a:r>
+              <a:rPr lang="en-GB" sz="1200" b="0" dirty="0" smtClean="0"/>
+              <a:t>values</a:t>
+            </a:r>
+            <a:endParaRPr lang="en-GB" sz="1200" b="0" dirty="0"/>
+          </a:p>
+          <a:p>
+            <a:pPr algn="l">
+              <a:spcBef>
+                <a:spcPts val="1200"/>
+              </a:spcBef>
+            </a:pPr>
+            <a:r>
+              <a:rPr lang="en-GB" sz="1200" dirty="0" smtClean="0"/>
+              <a:t>VECTO </a:t>
+            </a:r>
+            <a:r>
+              <a:rPr lang="en-GB" sz="1200" dirty="0"/>
+              <a:t>2.1.3</a:t>
+            </a:r>
+          </a:p>
+          <a:p>
+            <a:pPr marL="171450" indent="-171450" algn="l">
+              <a:spcBef>
+                <a:spcPts val="600"/>
+              </a:spcBef>
+              <a:buFont typeface="Arial" panose="020B0604020202020204" pitchFamily="34" charset="0"/>
+              <a:buChar char="•"/>
+            </a:pPr>
+            <a:r>
+              <a:rPr lang="en-GB" sz="1200" b="0" dirty="0" err="1"/>
+              <a:t>PwheelPos</a:t>
+            </a:r>
+            <a:r>
+              <a:rPr lang="en-GB" sz="1200" b="0" dirty="0"/>
+              <a:t> output in VSUM file.</a:t>
+            </a:r>
+          </a:p>
+          <a:p>
+            <a:pPr marL="171450" indent="-171450" algn="l">
+              <a:spcBef>
+                <a:spcPts val="600"/>
+              </a:spcBef>
+              <a:buFont typeface="Arial" panose="020B0604020202020204" pitchFamily="34" charset="0"/>
+              <a:buChar char="•"/>
+            </a:pPr>
+            <a:r>
+              <a:rPr lang="en-GB" sz="1200" b="0" dirty="0"/>
+              <a:t>Implemented new Cd*A(v) method</a:t>
+            </a:r>
+          </a:p>
+          <a:p>
+            <a:pPr marL="171450" indent="-171450" algn="l">
+              <a:spcBef>
+                <a:spcPts val="600"/>
+              </a:spcBef>
+              <a:buFont typeface="Arial" panose="020B0604020202020204" pitchFamily="34" charset="0"/>
+              <a:buChar char="•"/>
+            </a:pPr>
+            <a:r>
+              <a:rPr lang="en-GB" sz="1200" b="0" dirty="0" err="1"/>
+              <a:t>Bugfix</a:t>
+            </a:r>
+            <a:r>
+              <a:rPr lang="en-GB" sz="1200" b="0" dirty="0"/>
+              <a:t> in TC model</a:t>
+            </a:r>
+          </a:p>
+          <a:p>
+            <a:pPr marL="171450" indent="-171450" algn="l">
+              <a:spcBef>
+                <a:spcPts val="600"/>
+              </a:spcBef>
+              <a:buFont typeface="Arial" panose="020B0604020202020204" pitchFamily="34" charset="0"/>
+              <a:buChar char="•"/>
+            </a:pPr>
+            <a:r>
+              <a:rPr lang="en-GB" sz="1200" b="0" dirty="0" err="1"/>
+              <a:t>Bugfix</a:t>
+            </a:r>
+            <a:r>
+              <a:rPr lang="en-GB" sz="1200" b="0" dirty="0"/>
+              <a:t>: Unit error in Cd(v) methods caused incorrect Delta-Cd value being </a:t>
+            </a:r>
+            <a:r>
+              <a:rPr lang="en-GB" sz="1200" b="0" dirty="0" smtClean="0"/>
+              <a:t>used</a:t>
+            </a:r>
+            <a:endParaRPr lang="en-GB" sz="1200" b="0" dirty="0"/>
+          </a:p>
+          <a:p>
+            <a:pPr algn="l">
+              <a:spcBef>
+                <a:spcPts val="1200"/>
+              </a:spcBef>
+            </a:pPr>
+            <a:r>
+              <a:rPr lang="en-GB" sz="1200" dirty="0" smtClean="0"/>
+              <a:t>VECTO </a:t>
+            </a:r>
+            <a:r>
+              <a:rPr lang="en-GB" sz="1200" dirty="0"/>
+              <a:t>2.1.2</a:t>
+            </a:r>
+          </a:p>
+          <a:p>
+            <a:pPr marL="171450" indent="-171450" algn="l">
+              <a:spcBef>
+                <a:spcPts val="600"/>
+              </a:spcBef>
+              <a:buFont typeface="Arial" panose="020B0604020202020204" pitchFamily="34" charset="0"/>
+              <a:buChar char="•"/>
+            </a:pPr>
+            <a:r>
+              <a:rPr lang="en-GB" sz="1200" b="0" dirty="0"/>
+              <a:t>Improved TC iteration for higher precision</a:t>
+            </a:r>
+          </a:p>
+          <a:p>
+            <a:pPr marL="171450" indent="-171450" algn="l">
+              <a:spcBef>
+                <a:spcPts val="600"/>
+              </a:spcBef>
+              <a:buFont typeface="Arial" panose="020B0604020202020204" pitchFamily="34" charset="0"/>
+              <a:buChar char="•"/>
+            </a:pPr>
+            <a:r>
+              <a:rPr lang="en-GB" sz="1200" b="0" dirty="0"/>
+              <a:t>Extended possible TC speed ratio </a:t>
+            </a:r>
+          </a:p>
+          <a:p>
+            <a:pPr algn="l">
+              <a:spcBef>
+                <a:spcPts val="1200"/>
+              </a:spcBef>
+            </a:pPr>
+            <a:r>
+              <a:rPr lang="en-GB" sz="1200" dirty="0" smtClean="0"/>
+              <a:t>VECTO </a:t>
+            </a:r>
+            <a:r>
+              <a:rPr lang="en-GB" sz="1200" dirty="0"/>
+              <a:t>2.1.1</a:t>
+            </a:r>
+          </a:p>
+          <a:p>
+            <a:pPr marL="171450" indent="-171450" algn="l">
+              <a:spcBef>
+                <a:spcPts val="600"/>
+              </a:spcBef>
+              <a:buFont typeface="Arial" panose="020B0604020202020204" pitchFamily="34" charset="0"/>
+              <a:buChar char="•"/>
+            </a:pPr>
+            <a:r>
+              <a:rPr lang="en-GB" sz="1200" b="0" dirty="0" err="1"/>
+              <a:t>Bugfix</a:t>
+            </a:r>
+            <a:r>
+              <a:rPr lang="en-GB" sz="1200" b="0" dirty="0"/>
+              <a:t>: Incorrect torque calculation in AT/TC model caused early up-shifts</a:t>
+            </a:r>
+          </a:p>
+          <a:p>
+            <a:pPr marL="171450" indent="-171450" algn="l">
+              <a:spcBef>
+                <a:spcPts val="600"/>
+              </a:spcBef>
+              <a:buFont typeface="Arial" panose="020B0604020202020204" pitchFamily="34" charset="0"/>
+              <a:buChar char="•"/>
+            </a:pPr>
+            <a:r>
+              <a:rPr lang="en-GB" sz="1200" b="0" dirty="0"/>
+              <a:t>Updated C-to-C shift strategy with </a:t>
+            </a:r>
+            <a:r>
+              <a:rPr lang="en-GB" sz="1200" b="0" dirty="0" err="1"/>
+              <a:t>acc_min</a:t>
+            </a:r>
+            <a:r>
+              <a:rPr lang="en-GB" sz="1200" b="0" dirty="0"/>
+              <a:t> rule (see V2.1)</a:t>
+            </a:r>
+          </a:p>
+        </p:txBody>
+      </p:sp>
+      <p:sp>
+        <p:nvSpPr>
+          <p:cNvPr id="4" name="Textfeld 3"/>
+          <p:cNvSpPr txBox="1"/>
+          <p:nvPr/>
+        </p:nvSpPr>
+        <p:spPr>
+          <a:xfrm>
+            <a:off x="107504" y="6032321"/>
+            <a:ext cx="8928992" cy="276999"/>
+          </a:xfrm>
+          <a:prstGeom prst="rect">
+            <a:avLst/>
+          </a:prstGeom>
+          <a:noFill/>
+          <a:ln>
+            <a:noFill/>
+          </a:ln>
+        </p:spPr>
+        <p:txBody>
+          <a:bodyPr wrap="square" rtlCol="0">
+            <a:spAutoFit/>
+          </a:bodyPr>
+          <a:lstStyle/>
+          <a:p>
+            <a:pPr algn="l">
+              <a:spcBef>
+                <a:spcPts val="0"/>
+              </a:spcBef>
+            </a:pPr>
+            <a:r>
+              <a:rPr lang="en-GB" sz="1200" b="0" i="1" dirty="0" smtClean="0"/>
+              <a:t>For </a:t>
+            </a:r>
+            <a:r>
+              <a:rPr lang="en-GB" sz="1200" b="0" i="1" dirty="0" smtClean="0"/>
+              <a:t>full changelog see VECTO Main Form &gt; Help &gt; User </a:t>
+            </a:r>
+            <a:r>
+              <a:rPr lang="en-GB" sz="1200" b="0" i="1" dirty="0" smtClean="0"/>
+              <a:t>Manual or </a:t>
+            </a:r>
+            <a:r>
+              <a:rPr lang="en-GB" sz="1200" b="0" i="1" dirty="0" smtClean="0">
+                <a:hlinkClick r:id="rId2"/>
+              </a:rPr>
+              <a:t>CITnet</a:t>
+            </a:r>
+            <a:r>
+              <a:rPr lang="en-GB" sz="1200" b="0" i="1" dirty="0" smtClean="0"/>
+              <a:t>.</a:t>
+            </a:r>
+          </a:p>
+        </p:txBody>
+      </p:sp>
+    </p:spTree>
+    <p:extLst>
+      <p:ext uri="{BB962C8B-B14F-4D97-AF65-F5344CB8AC3E}">
+        <p14:creationId xmlns:p14="http://schemas.microsoft.com/office/powerpoint/2010/main" val="1294466196"/>
+      </p:ext>
+    </p:extLst>
+  </p:cSld>
+  <p:clrMapOvr>
+    <a:masterClrMapping/>
+  </p:clrMapOvr>
+  <p:timing>
+    <p:tnLst>
+      <p:par>
+        <p:cTn id="1" dur="indefinite" restart="never" nodeType="tmRoot"/>
+      </p:par>
+    </p:tnLst>
+  </p:timing>
+</p:sld>
+</file>
+
+<file path=ppt/slides/slide9.xml><?xml version="1.0" encoding="utf-8"?>
 <p:sld xmlns:a="http://schemas.openxmlformats.org/drawingml/2006/main" xmlns:r="http://schemas.openxmlformats.org/officeDocument/2006/relationships" xmlns:p="http://schemas.openxmlformats.org/presentationml/2006/main">
   <p:cSld>
     <p:spTree>
@@ -12067,479 +13071,6 @@
     <p:extLst>
       <p:ext uri="{BB962C8B-B14F-4D97-AF65-F5344CB8AC3E}">
         <p14:creationId xmlns:p14="http://schemas.microsoft.com/office/powerpoint/2010/main" val="1082186334"/>
-      </p:ext>
-    </p:extLst>
-  </p:cSld>
-  <p:clrMapOvr>
-    <a:masterClrMapping/>
-  </p:clrMapOvr>
-  <p:timing>
-    <p:tnLst>
-      <p:par>
-        <p:cTn id="1" dur="indefinite" restart="never" nodeType="tmRoot"/>
-      </p:par>
-    </p:tnLst>
-  </p:timing>
-</p:sld>
-</file>
-
-<file path=ppt/slides/slide9.xml><?xml version="1.0" encoding="utf-8"?>
-<p:sld xmlns:a="http://schemas.openxmlformats.org/drawingml/2006/main" xmlns:r="http://schemas.openxmlformats.org/officeDocument/2006/relationships" xmlns:p="http://schemas.openxmlformats.org/presentationml/2006/main">
-  <p:cSld>
-    <p:spTree>
-      <p:nvGrpSpPr>
-        <p:cNvPr id="1" name=""/>
-        <p:cNvGrpSpPr/>
-        <p:nvPr/>
-      </p:nvGrpSpPr>
-      <p:grpSpPr>
-        <a:xfrm>
-          <a:off x="0" y="0"/>
-          <a:ext cx="0" cy="0"/>
-          <a:chOff x="0" y="0"/>
-          <a:chExt cx="0" cy="0"/>
-        </a:xfrm>
-      </p:grpSpPr>
-      <p:sp>
-        <p:nvSpPr>
-          <p:cNvPr id="5" name="Rectangle 3"/>
-          <p:cNvSpPr txBox="1">
-            <a:spLocks noChangeArrowheads="1"/>
-          </p:cNvSpPr>
-          <p:nvPr/>
-        </p:nvSpPr>
-        <p:spPr bwMode="auto">
-          <a:xfrm>
-            <a:off x="0" y="778669"/>
-            <a:ext cx="9144000" cy="346075"/>
-          </a:xfrm>
-          <a:prstGeom prst="rect">
-            <a:avLst/>
-          </a:prstGeom>
-          <a:noFill/>
-          <a:ln>
-            <a:noFill/>
-          </a:ln>
-          <a:effectLst/>
-          <a:extLst>
-            <a:ext uri="{909E8E84-426E-40DD-AFC4-6F175D3DCCD1}">
-              <a14:hiddenFill xmlns:a14="http://schemas.microsoft.com/office/drawing/2010/main">
-                <a:solidFill>
-                  <a:srgbClr val="DDDDDD"/>
-                </a:solidFill>
-              </a14:hiddenFill>
-            </a:ext>
-            <a:ext uri="{91240B29-F687-4F45-9708-019B960494DF}">
-              <a14:hiddenLine xmlns:a14="http://schemas.microsoft.com/office/drawing/2010/main" w="9525">
-                <a:solidFill>
-                  <a:schemeClr val="tx1"/>
-                </a:solidFill>
-                <a:miter lim="800000"/>
-                <a:headEnd/>
-                <a:tailEnd/>
-              </a14:hiddenLine>
-            </a:ext>
-            <a:ext uri="{AF507438-7753-43E0-B8FC-AC1667EBCBE1}">
-              <a14:hiddenEffects xmlns:a14="http://schemas.microsoft.com/office/drawing/2010/main">
-                <a:effectLst>
-                  <a:outerShdw dist="35921" dir="2700000" algn="ctr" rotWithShape="0">
-                    <a:schemeClr val="bg2"/>
-                  </a:outerShdw>
-                </a:effectLst>
-              </a14:hiddenEffects>
-            </a:ext>
-          </a:extLst>
-        </p:spPr>
-        <p:txBody>
-          <a:bodyPr vert="horz" wrap="square" lIns="91440" tIns="45720" rIns="91440" bIns="45720" numCol="1" anchor="ctr" anchorCtr="0" compatLnSpc="1">
-            <a:prstTxWarp prst="textNoShape">
-              <a:avLst/>
-            </a:prstTxWarp>
-          </a:bodyPr>
-          <a:lstStyle>
-            <a:lvl1pPr algn="ctr" rtl="0" eaLnBrk="0" fontAlgn="base" hangingPunct="0">
-              <a:spcBef>
-                <a:spcPct val="0"/>
-              </a:spcBef>
-              <a:spcAft>
-                <a:spcPct val="0"/>
-              </a:spcAft>
-              <a:defRPr sz="2400" b="1">
-                <a:solidFill>
-                  <a:srgbClr val="990000"/>
-                </a:solidFill>
-                <a:latin typeface="+mj-lt"/>
-                <a:ea typeface="+mj-ea"/>
-                <a:cs typeface="+mj-cs"/>
-              </a:defRPr>
-            </a:lvl1pPr>
-            <a:lvl2pPr algn="ctr" rtl="0" eaLnBrk="0" fontAlgn="base" hangingPunct="0">
-              <a:spcBef>
-                <a:spcPct val="0"/>
-              </a:spcBef>
-              <a:spcAft>
-                <a:spcPct val="0"/>
-              </a:spcAft>
-              <a:defRPr sz="2400" b="1">
-                <a:solidFill>
-                  <a:srgbClr val="990000"/>
-                </a:solidFill>
-                <a:latin typeface="Arial" pitchFamily="34" charset="0"/>
-              </a:defRPr>
-            </a:lvl2pPr>
-            <a:lvl3pPr algn="ctr" rtl="0" eaLnBrk="0" fontAlgn="base" hangingPunct="0">
-              <a:spcBef>
-                <a:spcPct val="0"/>
-              </a:spcBef>
-              <a:spcAft>
-                <a:spcPct val="0"/>
-              </a:spcAft>
-              <a:defRPr sz="2400" b="1">
-                <a:solidFill>
-                  <a:srgbClr val="990000"/>
-                </a:solidFill>
-                <a:latin typeface="Arial" pitchFamily="34" charset="0"/>
-              </a:defRPr>
-            </a:lvl3pPr>
-            <a:lvl4pPr algn="ctr" rtl="0" eaLnBrk="0" fontAlgn="base" hangingPunct="0">
-              <a:spcBef>
-                <a:spcPct val="0"/>
-              </a:spcBef>
-              <a:spcAft>
-                <a:spcPct val="0"/>
-              </a:spcAft>
-              <a:defRPr sz="2400" b="1">
-                <a:solidFill>
-                  <a:srgbClr val="990000"/>
-                </a:solidFill>
-                <a:latin typeface="Arial" pitchFamily="34" charset="0"/>
-              </a:defRPr>
-            </a:lvl4pPr>
-            <a:lvl5pPr algn="ctr" rtl="0" eaLnBrk="0" fontAlgn="base" hangingPunct="0">
-              <a:spcBef>
-                <a:spcPct val="0"/>
-              </a:spcBef>
-              <a:spcAft>
-                <a:spcPct val="0"/>
-              </a:spcAft>
-              <a:defRPr sz="2400" b="1">
-                <a:solidFill>
-                  <a:srgbClr val="990000"/>
-                </a:solidFill>
-                <a:latin typeface="Arial" pitchFamily="34" charset="0"/>
-              </a:defRPr>
-            </a:lvl5pPr>
-            <a:lvl6pPr marL="457200" algn="ctr" rtl="0" fontAlgn="base">
-              <a:spcBef>
-                <a:spcPct val="0"/>
-              </a:spcBef>
-              <a:spcAft>
-                <a:spcPct val="0"/>
-              </a:spcAft>
-              <a:defRPr sz="2400" b="1">
-                <a:solidFill>
-                  <a:srgbClr val="990000"/>
-                </a:solidFill>
-                <a:latin typeface="Arial" pitchFamily="34" charset="0"/>
-              </a:defRPr>
-            </a:lvl6pPr>
-            <a:lvl7pPr marL="914400" algn="ctr" rtl="0" fontAlgn="base">
-              <a:spcBef>
-                <a:spcPct val="0"/>
-              </a:spcBef>
-              <a:spcAft>
-                <a:spcPct val="0"/>
-              </a:spcAft>
-              <a:defRPr sz="2400" b="1">
-                <a:solidFill>
-                  <a:srgbClr val="990000"/>
-                </a:solidFill>
-                <a:latin typeface="Arial" pitchFamily="34" charset="0"/>
-              </a:defRPr>
-            </a:lvl7pPr>
-            <a:lvl8pPr marL="1371600" algn="ctr" rtl="0" fontAlgn="base">
-              <a:spcBef>
-                <a:spcPct val="0"/>
-              </a:spcBef>
-              <a:spcAft>
-                <a:spcPct val="0"/>
-              </a:spcAft>
-              <a:defRPr sz="2400" b="1">
-                <a:solidFill>
-                  <a:srgbClr val="990000"/>
-                </a:solidFill>
-                <a:latin typeface="Arial" pitchFamily="34" charset="0"/>
-              </a:defRPr>
-            </a:lvl8pPr>
-            <a:lvl9pPr marL="1828800" algn="ctr" rtl="0" fontAlgn="base">
-              <a:spcBef>
-                <a:spcPct val="0"/>
-              </a:spcBef>
-              <a:spcAft>
-                <a:spcPct val="0"/>
-              </a:spcAft>
-              <a:defRPr sz="2400" b="1">
-                <a:solidFill>
-                  <a:srgbClr val="990000"/>
-                </a:solidFill>
-                <a:latin typeface="Arial" pitchFamily="34" charset="0"/>
-              </a:defRPr>
-            </a:lvl9pPr>
-          </a:lstStyle>
-          <a:p>
-            <a:pPr eaLnBrk="1" hangingPunct="1"/>
-            <a:r>
-              <a:rPr lang="en-GB" sz="2800" kern="0" dirty="0" smtClean="0"/>
-              <a:t>VECTO 2.1</a:t>
-            </a:r>
-            <a:endParaRPr lang="en-GB" sz="2800" kern="0" dirty="0"/>
-          </a:p>
-        </p:txBody>
-      </p:sp>
-      <p:sp>
-        <p:nvSpPr>
-          <p:cNvPr id="6" name="Textfeld 5"/>
-          <p:cNvSpPr txBox="1"/>
-          <p:nvPr/>
-        </p:nvSpPr>
-        <p:spPr>
-          <a:xfrm>
-            <a:off x="251522" y="1456615"/>
-            <a:ext cx="8496944" cy="3708708"/>
-          </a:xfrm>
-          <a:prstGeom prst="rect">
-            <a:avLst/>
-          </a:prstGeom>
-          <a:noFill/>
-          <a:ln>
-            <a:noFill/>
-          </a:ln>
-        </p:spPr>
-        <p:txBody>
-          <a:bodyPr wrap="square" rtlCol="0">
-            <a:spAutoFit/>
-          </a:bodyPr>
-          <a:lstStyle/>
-          <a:p>
-            <a:pPr marL="342900" indent="-342900" algn="l">
-              <a:lnSpc>
-                <a:spcPct val="150000"/>
-              </a:lnSpc>
-              <a:spcBef>
-                <a:spcPts val="600"/>
-              </a:spcBef>
-              <a:buFont typeface="Arial" pitchFamily="34" charset="0"/>
-              <a:buChar char="•"/>
-            </a:pPr>
-            <a:r>
-              <a:rPr lang="en-GB" dirty="0" smtClean="0"/>
-              <a:t>New </a:t>
-            </a:r>
-            <a:r>
-              <a:rPr lang="en-GB" dirty="0"/>
-              <a:t>AT/TC </a:t>
-            </a:r>
-            <a:r>
-              <a:rPr lang="en-GB" dirty="0" smtClean="0"/>
-              <a:t>options: </a:t>
-            </a:r>
-          </a:p>
-          <a:p>
-            <a:pPr marL="800100" lvl="1" indent="-342900" algn="l">
-              <a:lnSpc>
-                <a:spcPct val="150000"/>
-              </a:lnSpc>
-              <a:spcBef>
-                <a:spcPts val="600"/>
-              </a:spcBef>
-              <a:buFont typeface="Arial" pitchFamily="34" charset="0"/>
-              <a:buChar char="•"/>
-            </a:pPr>
-            <a:r>
-              <a:rPr lang="en-GB" sz="1400" b="0" dirty="0" smtClean="0"/>
-              <a:t>Limit engine rpm in torque converter operation acc. ≥ </a:t>
-            </a:r>
-            <a:r>
-              <a:rPr lang="en-GB" sz="1400" b="0" dirty="0" err="1" smtClean="0"/>
-              <a:t>acc</a:t>
-            </a:r>
-            <a:r>
-              <a:rPr lang="en-GB" sz="1400" b="0" baseline="-25000" dirty="0" err="1" smtClean="0"/>
-              <a:t>min</a:t>
-            </a:r>
-            <a:endParaRPr lang="en-GB" sz="1400" b="0" dirty="0" smtClean="0"/>
-          </a:p>
-          <a:p>
-            <a:pPr marL="800100" lvl="1" indent="-342900" algn="l">
-              <a:lnSpc>
-                <a:spcPct val="150000"/>
-              </a:lnSpc>
-              <a:spcBef>
-                <a:spcPts val="600"/>
-              </a:spcBef>
-              <a:buFont typeface="Arial" pitchFamily="34" charset="0"/>
-              <a:buChar char="•"/>
-            </a:pPr>
-            <a:r>
-              <a:rPr lang="en-GB" sz="1400" b="0" dirty="0" smtClean="0"/>
-              <a:t>Shift up (C-to-L, L-to-L) </a:t>
-            </a:r>
-            <a:r>
-              <a:rPr lang="en-GB" sz="1400" b="0" dirty="0"/>
-              <a:t>if acc. ≥ </a:t>
-            </a:r>
-            <a:r>
-              <a:rPr lang="en-GB" sz="1400" b="0" dirty="0" err="1" smtClean="0"/>
-              <a:t>acc</a:t>
-            </a:r>
-            <a:r>
-              <a:rPr lang="en-GB" sz="1400" b="0" baseline="-25000" dirty="0" err="1" smtClean="0"/>
-              <a:t>min</a:t>
-            </a:r>
-            <a:r>
-              <a:rPr lang="en-GB" sz="1400" b="0" dirty="0" smtClean="0"/>
-              <a:t> and next-gear-rpm &gt; threshold</a:t>
-            </a:r>
-          </a:p>
-          <a:p>
-            <a:pPr marL="800100" lvl="1" indent="-342900" algn="l">
-              <a:lnSpc>
-                <a:spcPct val="150000"/>
-              </a:lnSpc>
-              <a:spcBef>
-                <a:spcPts val="600"/>
-              </a:spcBef>
-              <a:buFont typeface="Arial" pitchFamily="34" charset="0"/>
-              <a:buChar char="•"/>
-            </a:pPr>
-            <a:r>
-              <a:rPr lang="en-GB" sz="1400" b="0" dirty="0" smtClean="0"/>
-              <a:t>rpm limit [1/min] and </a:t>
-            </a:r>
-            <a:r>
-              <a:rPr lang="en-GB" sz="1400" b="0" dirty="0" err="1" smtClean="0"/>
-              <a:t>acc</a:t>
-            </a:r>
-            <a:r>
-              <a:rPr lang="en-GB" sz="1400" b="0" baseline="-25000" dirty="0" err="1" smtClean="0"/>
-              <a:t>min</a:t>
-            </a:r>
-            <a:r>
-              <a:rPr lang="en-GB" sz="1400" b="0" dirty="0" smtClean="0"/>
-              <a:t> [m/s²] parameters are currently user-defined</a:t>
-            </a:r>
-          </a:p>
-          <a:p>
-            <a:pPr marL="800100" lvl="1" indent="-342900" algn="l">
-              <a:lnSpc>
-                <a:spcPct val="150000"/>
-              </a:lnSpc>
-              <a:spcBef>
-                <a:spcPts val="600"/>
-              </a:spcBef>
-              <a:buFont typeface="Arial" pitchFamily="34" charset="0"/>
-              <a:buChar char="•"/>
-            </a:pPr>
-            <a:r>
-              <a:rPr lang="en-GB" sz="1400" b="0" dirty="0"/>
-              <a:t>C-to-C up-shift condition based on N80h engine speed (instead of N95h)</a:t>
-            </a:r>
-            <a:endParaRPr lang="en-GB" sz="1400" b="0" dirty="0" smtClean="0"/>
-          </a:p>
-          <a:p>
-            <a:pPr marL="342900" indent="-342900" algn="l">
-              <a:lnSpc>
-                <a:spcPct val="150000"/>
-              </a:lnSpc>
-              <a:spcBef>
-                <a:spcPts val="600"/>
-              </a:spcBef>
-              <a:buFont typeface="Arial" pitchFamily="34" charset="0"/>
-              <a:buChar char="•"/>
-            </a:pPr>
-            <a:r>
-              <a:rPr lang="en-GB" dirty="0" err="1" smtClean="0"/>
-              <a:t>P</a:t>
-            </a:r>
-            <a:r>
-              <a:rPr lang="en-GB" baseline="-25000" dirty="0" err="1" smtClean="0"/>
-              <a:t>wheel</a:t>
-            </a:r>
-            <a:r>
-              <a:rPr lang="en-GB" dirty="0" smtClean="0"/>
-              <a:t> input (</a:t>
-            </a:r>
-            <a:r>
-              <a:rPr lang="en-GB" dirty="0" err="1" smtClean="0"/>
-              <a:t>SiCo</a:t>
-            </a:r>
-            <a:r>
-              <a:rPr lang="en-GB" dirty="0" smtClean="0"/>
-              <a:t> test mode)</a:t>
-            </a:r>
-          </a:p>
-          <a:p>
-            <a:pPr marL="800100" lvl="1" indent="-342900" algn="l">
-              <a:lnSpc>
-                <a:spcPct val="150000"/>
-              </a:lnSpc>
-              <a:spcBef>
-                <a:spcPts val="600"/>
-              </a:spcBef>
-              <a:buFont typeface="Arial" pitchFamily="34" charset="0"/>
-              <a:buChar char="•"/>
-            </a:pPr>
-            <a:r>
-              <a:rPr lang="en-GB" sz="1400" b="0" dirty="0" err="1" smtClean="0"/>
-              <a:t>P</a:t>
-            </a:r>
-            <a:r>
-              <a:rPr lang="en-GB" sz="1400" b="0" baseline="-25000" dirty="0" err="1" smtClean="0"/>
-              <a:t>wheel</a:t>
-            </a:r>
-            <a:r>
-              <a:rPr lang="en-GB" sz="1400" b="0" dirty="0" smtClean="0"/>
-              <a:t> as cycle input</a:t>
-            </a:r>
-          </a:p>
-          <a:p>
-            <a:pPr marL="800100" lvl="1" indent="-342900" algn="l">
-              <a:lnSpc>
-                <a:spcPct val="150000"/>
-              </a:lnSpc>
-              <a:spcBef>
-                <a:spcPts val="600"/>
-              </a:spcBef>
-              <a:buFont typeface="Arial" pitchFamily="34" charset="0"/>
-              <a:buChar char="•"/>
-            </a:pPr>
-            <a:r>
-              <a:rPr lang="en-GB" sz="1400" b="0" dirty="0" smtClean="0"/>
-              <a:t>Overwrites power calculation</a:t>
-            </a:r>
-          </a:p>
-          <a:p>
-            <a:pPr marL="800100" lvl="1" indent="-342900" algn="l">
-              <a:lnSpc>
-                <a:spcPct val="150000"/>
-              </a:lnSpc>
-              <a:spcBef>
-                <a:spcPts val="600"/>
-              </a:spcBef>
-              <a:buFont typeface="Arial" pitchFamily="34" charset="0"/>
-              <a:buChar char="•"/>
-            </a:pPr>
-            <a:r>
-              <a:rPr lang="en-GB" sz="1400" b="0" dirty="0" smtClean="0"/>
-              <a:t>VECTO only calculates power train losses, engine torque/rpm and fuel consumption</a:t>
-            </a:r>
-          </a:p>
-        </p:txBody>
-      </p:sp>
-    </p:spTree>
-    <p:extLst>
-      <p:ext uri="{BB962C8B-B14F-4D97-AF65-F5344CB8AC3E}">
-        <p14:creationId xmlns:p14="http://schemas.microsoft.com/office/powerpoint/2010/main" val="1818809352"/>
       </p:ext>
     </p:extLst>
   </p:cSld>

</xml_diff>

<commit_message>
- User Manual update - Fix in JIRA dialog
</commit_message>
<xml_diff>
--- a/User Manual Source/Release Notes V2.2.pptx
+++ b/User Manual Source/Release Notes V2.2.pptx
@@ -11857,60 +11857,6 @@
           </a:p>
         </p:txBody>
       </p:sp>
-      <p:pic>
-        <p:nvPicPr>
-          <p:cNvPr id="4099" name="Picture 3"/>
-          <p:cNvPicPr>
-            <a:picLocks noChangeAspect="1" noChangeArrowheads="1"/>
-          </p:cNvPicPr>
-          <p:nvPr/>
-        </p:nvPicPr>
-        <p:blipFill>
-          <a:blip r:embed="rId4">
-            <a:extLst>
-              <a:ext uri="{28A0092B-C50C-407E-A947-70E740481C1C}">
-                <a14:useLocalDpi xmlns:a14="http://schemas.microsoft.com/office/drawing/2010/main" val="0"/>
-              </a:ext>
-            </a:extLst>
-          </a:blip>
-          <a:srcRect/>
-          <a:stretch>
-            <a:fillRect/>
-          </a:stretch>
-        </p:blipFill>
-        <p:spPr bwMode="auto">
-          <a:xfrm>
-            <a:off x="4572000" y="2420888"/>
-            <a:ext cx="4295775" cy="2647950"/>
-          </a:xfrm>
-          <a:prstGeom prst="rect">
-            <a:avLst/>
-          </a:prstGeom>
-          <a:noFill/>
-          <a:ln>
-            <a:noFill/>
-          </a:ln>
-          <a:extLst>
-            <a:ext uri="{909E8E84-426E-40DD-AFC4-6F175D3DCCD1}">
-              <a14:hiddenFill xmlns:a14="http://schemas.microsoft.com/office/drawing/2010/main">
-                <a:solidFill>
-                  <a:schemeClr val="accent1"/>
-                </a:solidFill>
-              </a14:hiddenFill>
-            </a:ext>
-            <a:ext uri="{91240B29-F687-4F45-9708-019B960494DF}">
-              <a14:hiddenLine xmlns:a14="http://schemas.microsoft.com/office/drawing/2010/main" w="9525">
-                <a:solidFill>
-                  <a:schemeClr val="tx1"/>
-                </a:solidFill>
-                <a:miter lim="800000"/>
-                <a:headEnd/>
-                <a:tailEnd/>
-              </a14:hiddenLine>
-            </a:ext>
-          </a:extLst>
-        </p:spPr>
-      </p:pic>
       <p:sp>
         <p:nvSpPr>
           <p:cNvPr id="22" name="Pfeil nach unten 21"/>
@@ -11978,6 +11924,60 @@
           </a:p>
         </p:txBody>
       </p:sp>
+      <p:pic>
+        <p:nvPicPr>
+          <p:cNvPr id="1026" name="Picture 2"/>
+          <p:cNvPicPr>
+            <a:picLocks noChangeAspect="1" noChangeArrowheads="1"/>
+          </p:cNvPicPr>
+          <p:nvPr/>
+        </p:nvPicPr>
+        <p:blipFill>
+          <a:blip r:embed="rId4">
+            <a:extLst>
+              <a:ext uri="{28A0092B-C50C-407E-A947-70E740481C1C}">
+                <a14:useLocalDpi xmlns:a14="http://schemas.microsoft.com/office/drawing/2010/main" val="0"/>
+              </a:ext>
+            </a:extLst>
+          </a:blip>
+          <a:srcRect/>
+          <a:stretch>
+            <a:fillRect/>
+          </a:stretch>
+        </p:blipFill>
+        <p:spPr bwMode="auto">
+          <a:xfrm>
+            <a:off x="4572000" y="2420888"/>
+            <a:ext cx="4295775" cy="2647950"/>
+          </a:xfrm>
+          <a:prstGeom prst="rect">
+            <a:avLst/>
+          </a:prstGeom>
+          <a:noFill/>
+          <a:ln>
+            <a:noFill/>
+          </a:ln>
+          <a:extLst>
+            <a:ext uri="{909E8E84-426E-40DD-AFC4-6F175D3DCCD1}">
+              <a14:hiddenFill xmlns:a14="http://schemas.microsoft.com/office/drawing/2010/main">
+                <a:solidFill>
+                  <a:schemeClr val="accent1"/>
+                </a:solidFill>
+              </a14:hiddenFill>
+            </a:ext>
+            <a:ext uri="{91240B29-F687-4F45-9708-019B960494DF}">
+              <a14:hiddenLine xmlns:a14="http://schemas.microsoft.com/office/drawing/2010/main" w="9525">
+                <a:solidFill>
+                  <a:schemeClr val="tx1"/>
+                </a:solidFill>
+                <a:miter lim="800000"/>
+                <a:headEnd/>
+                <a:tailEnd/>
+              </a14:hiddenLine>
+            </a:ext>
+          </a:extLst>
+        </p:spPr>
+      </p:pic>
     </p:spTree>
     <p:extLst>
       <p:ext uri="{BB962C8B-B14F-4D97-AF65-F5344CB8AC3E}">

</xml_diff>